<commit_message>
Finalized poster, images added
</commit_message>
<xml_diff>
--- a/AI_in_the_workplace-sentiment_analysis-poster-Parekar.pptx
+++ b/AI_in_the_workplace-sentiment_analysis-poster-Parekar.pptx
@@ -905,7 +905,7 @@
                 <a:spcPct val="0"/>
               </a:spcBef>
             </a:pPr>
-            <a:endParaRPr lang="en-US" altLang="en-US"/>
+            <a:endParaRPr lang="en-US" altLang="en-US" dirty="0"/>
           </a:p>
         </p:txBody>
       </p:sp>
@@ -5561,19 +5561,8 @@
                 <a:latin typeface="Times New Roman" panose="02020603050405020304" pitchFamily="18" charset="0"/>
                 <a:cs typeface="Times New Roman" panose="02020603050405020304" pitchFamily="18" charset="0"/>
               </a:rPr>
-              <a:t>Figure 1: Graph depicting the sentiment analysis of AI perceptions in the workplace. The number of positive and negative words used to describe AI are plotted against the </a:t>
-            </a:r>
-            <a:r>
-              <a:rPr lang="en-US" altLang="en-US" sz="3200" i="1">
-                <a:latin typeface="Times New Roman" panose="02020603050405020304" pitchFamily="18" charset="0"/>
-                <a:cs typeface="Times New Roman" panose="02020603050405020304" pitchFamily="18" charset="0"/>
-              </a:rPr>
-              <a:t>respective sentiment.</a:t>
-            </a:r>
-            <a:endParaRPr lang="en-US" altLang="en-US" sz="3200" i="1" dirty="0">
-              <a:latin typeface="Times New Roman" panose="02020603050405020304" pitchFamily="18" charset="0"/>
-              <a:cs typeface="Times New Roman" panose="02020603050405020304" pitchFamily="18" charset="0"/>
-            </a:endParaRPr>
+              <a:t>Figure 1: Graph depicting the sentiment analysis of AI perceptions in the workplace. The number of positive and negative words used to describe AI are plotted against the respective sentiment.</a:t>
+            </a:r>
           </a:p>
         </p:txBody>
       </p:sp>
@@ -6918,21 +6907,7 @@
                 <a:latin typeface="Times New Roman" panose="02020603050405020304" pitchFamily="18" charset="0"/>
                 <a:cs typeface="Times New Roman" panose="02020603050405020304" pitchFamily="18" charset="0"/>
               </a:rPr>
-              <a:t>To gauge current public perceptions of AI, I decided to compile a list articles from popular sources by manually selecting articles that appeared through the Google search “News” section for the search terms “perceptions of AI in the workplace” and “employee perceptions of AI.” This led to the acquisition of 110 articles. Of these, 81 articles were able to be web-scraped. Web scraping was conducted using the </a:t>
-            </a:r>
-            <a:r>
-              <a:rPr lang="en-US" sz="4000" dirty="0" err="1">
-                <a:latin typeface="Times New Roman" panose="02020603050405020304" pitchFamily="18" charset="0"/>
-                <a:cs typeface="Times New Roman" panose="02020603050405020304" pitchFamily="18" charset="0"/>
-              </a:rPr>
-              <a:t>rvest</a:t>
-            </a:r>
-            <a:r>
-              <a:rPr lang="en-US" sz="4000" dirty="0">
-                <a:latin typeface="Times New Roman" panose="02020603050405020304" pitchFamily="18" charset="0"/>
-                <a:cs typeface="Times New Roman" panose="02020603050405020304" pitchFamily="18" charset="0"/>
-              </a:rPr>
-              <a:t> package in RStudio. Upon extraction of the website content, sentiment analysis was performed on the data using the </a:t>
+              <a:t>To gauge current public perceptions of AI, I decided to compile a list of articles from popular sources by manually selecting articles that appeared through the Google search “News” section for the search terms “perceptions of AI in the workplace” and “employee perceptions of AI.” This led to the acquisition of 110 articles. Of these, 81 articles were successfully web-scraped. The web scraping was conducted using the rvest package in RStudio. Upon extraction of the website content, sentiment analysis was performed on the data using the </a:t>
             </a:r>
             <a:r>
               <a:rPr lang="en-US" sz="4000" dirty="0" err="1">
@@ -7389,7 +7364,7 @@
                 <a:latin typeface="Times New Roman" panose="02020603050405020304" pitchFamily="18" charset="0"/>
                 <a:cs typeface="Times New Roman" panose="02020603050405020304" pitchFamily="18" charset="0"/>
               </a:rPr>
-              <a:t>Figure 2: Commonly used ”positive” and “negative” words used to describe AI</a:t>
+              <a:t>Figure 2: Commonly used ”positive” and “negative” words used to describe AI.</a:t>
             </a:r>
           </a:p>
         </p:txBody>
@@ -7669,12 +7644,330 @@
                 <a:latin typeface="Times New Roman" panose="02020603050405020304" pitchFamily="18" charset="0"/>
                 <a:cs typeface="Times New Roman" panose="02020603050405020304" pitchFamily="18" charset="0"/>
               </a:rPr>
-              <a:t>Castagno &amp; Khalifa, 2020; Brauner et al., 2023). Thus, organizations should aim to mitigate these concerns to ease AI adoption in the workplace.</a:t>
+              <a:t>Castagno &amp; Khalifa, 2020; Brauner et al., 2023). Hence, organizations should aim to mitigate these concerns to ease AI adoption in the workplace.</a:t>
             </a:r>
             <a:endParaRPr lang="en-US" altLang="en-US" sz="4000" dirty="0">
               <a:latin typeface="Times New Roman" panose="02020603050405020304" pitchFamily="18" charset="0"/>
               <a:cs typeface="Times New Roman" panose="02020603050405020304" pitchFamily="18" charset="0"/>
             </a:endParaRPr>
+          </a:p>
+        </p:txBody>
+      </p:sp>
+      <p:pic>
+        <p:nvPicPr>
+          <p:cNvPr id="19" name="Picture 18">
+            <a:extLst>
+              <a:ext uri="{FF2B5EF4-FFF2-40B4-BE49-F238E27FC236}">
+                <a16:creationId xmlns:a16="http://schemas.microsoft.com/office/drawing/2014/main" id="{D0E5C03E-98D0-D89B-1AF0-F3433FFBACE4}"/>
+              </a:ext>
+            </a:extLst>
+          </p:cNvPr>
+          <p:cNvPicPr>
+            <a:picLocks noChangeAspect="1"/>
+          </p:cNvPicPr>
+          <p:nvPr/>
+        </p:nvPicPr>
+        <p:blipFill>
+          <a:blip r:embed="rId7"/>
+          <a:stretch>
+            <a:fillRect/>
+          </a:stretch>
+        </p:blipFill>
+        <p:spPr>
+          <a:xfrm>
+            <a:off x="38822764" y="27559293"/>
+            <a:ext cx="3175000" cy="3175000"/>
+          </a:xfrm>
+          <a:prstGeom prst="rect">
+            <a:avLst/>
+          </a:prstGeom>
+        </p:spPr>
+      </p:pic>
+      <p:pic>
+        <p:nvPicPr>
+          <p:cNvPr id="20" name="Picture 19">
+            <a:extLst>
+              <a:ext uri="{FF2B5EF4-FFF2-40B4-BE49-F238E27FC236}">
+                <a16:creationId xmlns:a16="http://schemas.microsoft.com/office/drawing/2014/main" id="{B67BAF3C-7208-A06C-D431-EA5A4680F75C}"/>
+              </a:ext>
+            </a:extLst>
+          </p:cNvPr>
+          <p:cNvPicPr>
+            <a:picLocks noChangeAspect="1"/>
+          </p:cNvPicPr>
+          <p:nvPr/>
+        </p:nvPicPr>
+        <p:blipFill>
+          <a:blip r:embed="rId8"/>
+          <a:stretch>
+            <a:fillRect/>
+          </a:stretch>
+        </p:blipFill>
+        <p:spPr>
+          <a:xfrm>
+            <a:off x="33186981" y="27559293"/>
+            <a:ext cx="3175000" cy="3175000"/>
+          </a:xfrm>
+          <a:prstGeom prst="rect">
+            <a:avLst/>
+          </a:prstGeom>
+        </p:spPr>
+      </p:pic>
+      <p:sp>
+        <p:nvSpPr>
+          <p:cNvPr id="21" name="TextBox 20">
+            <a:extLst>
+              <a:ext uri="{FF2B5EF4-FFF2-40B4-BE49-F238E27FC236}">
+                <a16:creationId xmlns:a16="http://schemas.microsoft.com/office/drawing/2014/main" id="{AFA198FB-99F6-BC29-E5BB-DB6A2F02D4B4}"/>
+              </a:ext>
+            </a:extLst>
+          </p:cNvPr>
+          <p:cNvSpPr txBox="1"/>
+          <p:nvPr/>
+        </p:nvSpPr>
+        <p:spPr>
+          <a:xfrm>
+            <a:off x="13547722" y="28102294"/>
+            <a:ext cx="16592551" cy="2215991"/>
+          </a:xfrm>
+          <a:prstGeom prst="rect">
+            <a:avLst/>
+          </a:prstGeom>
+          <a:noFill/>
+        </p:spPr>
+        <p:txBody>
+          <a:bodyPr wrap="square" rtlCol="0">
+            <a:spAutoFit/>
+          </a:bodyPr>
+          <a:lstStyle/>
+          <a:p>
+            <a:pPr algn="ctr"/>
+            <a:r>
+              <a:rPr lang="en-US" sz="4600" b="0" i="1" dirty="0">
+                <a:solidFill>
+                  <a:srgbClr val="000000"/>
+                </a:solidFill>
+                <a:effectLst/>
+                <a:latin typeface="Times New Roman" panose="02020603050405020304" pitchFamily="18" charset="0"/>
+                <a:cs typeface="Times New Roman" panose="02020603050405020304" pitchFamily="18" charset="0"/>
+              </a:rPr>
+              <a:t>“AI is expected to create new job opportunities, with 61% of employees believing AI will lead to new career pathways.”</a:t>
+            </a:r>
+          </a:p>
+          <a:p>
+            <a:pPr algn="ctr"/>
+            <a:r>
+              <a:rPr lang="en-US" sz="4600" b="0" i="1" dirty="0">
+                <a:solidFill>
+                  <a:srgbClr val="000000"/>
+                </a:solidFill>
+                <a:effectLst/>
+                <a:latin typeface="Times New Roman" panose="02020603050405020304" pitchFamily="18" charset="0"/>
+                <a:cs typeface="Times New Roman" panose="02020603050405020304" pitchFamily="18" charset="0"/>
+              </a:rPr>
+              <a:t> – Business Reporter, 2025</a:t>
+            </a:r>
+            <a:endParaRPr lang="en-US" sz="4600" i="1" dirty="0">
+              <a:latin typeface="Times New Roman" panose="02020603050405020304" pitchFamily="18" charset="0"/>
+              <a:cs typeface="Times New Roman" panose="02020603050405020304" pitchFamily="18" charset="0"/>
+            </a:endParaRPr>
+          </a:p>
+        </p:txBody>
+      </p:sp>
+      <p:sp>
+        <p:nvSpPr>
+          <p:cNvPr id="22" name="TextBox 21">
+            <a:extLst>
+              <a:ext uri="{FF2B5EF4-FFF2-40B4-BE49-F238E27FC236}">
+                <a16:creationId xmlns:a16="http://schemas.microsoft.com/office/drawing/2014/main" id="{811B0FA2-4E16-37EF-4208-37B748B45158}"/>
+              </a:ext>
+            </a:extLst>
+          </p:cNvPr>
+          <p:cNvSpPr txBox="1"/>
+          <p:nvPr/>
+        </p:nvSpPr>
+        <p:spPr>
+          <a:xfrm>
+            <a:off x="13547722" y="24887099"/>
+            <a:ext cx="16592551" cy="2923877"/>
+          </a:xfrm>
+          <a:prstGeom prst="rect">
+            <a:avLst/>
+          </a:prstGeom>
+          <a:noFill/>
+        </p:spPr>
+        <p:txBody>
+          <a:bodyPr wrap="square" rtlCol="0">
+            <a:spAutoFit/>
+          </a:bodyPr>
+          <a:lstStyle/>
+          <a:p>
+            <a:pPr algn="ctr"/>
+            <a:r>
+              <a:rPr lang="en-US" sz="4600" b="0" i="1" dirty="0">
+                <a:solidFill>
+                  <a:srgbClr val="000000"/>
+                </a:solidFill>
+                <a:effectLst/>
+                <a:latin typeface="Times New Roman" panose="02020603050405020304" pitchFamily="18" charset="0"/>
+                <a:cs typeface="Times New Roman" panose="02020603050405020304" pitchFamily="18" charset="0"/>
+              </a:rPr>
+              <a:t>“An overwhelming majority of respondents (92%) say AI is having a positive impact on their work and more than one-quarter (26%) call AI a ‘miracle.’ ”</a:t>
+            </a:r>
+          </a:p>
+          <a:p>
+            <a:pPr algn="ctr"/>
+            <a:r>
+              <a:rPr lang="en-US" sz="4600" b="0" i="1" dirty="0">
+                <a:solidFill>
+                  <a:srgbClr val="000000"/>
+                </a:solidFill>
+                <a:effectLst/>
+                <a:latin typeface="Times New Roman" panose="02020603050405020304" pitchFamily="18" charset="0"/>
+                <a:cs typeface="Times New Roman" panose="02020603050405020304" pitchFamily="18" charset="0"/>
+              </a:rPr>
+              <a:t> – MIT Technology Review, 2023</a:t>
+            </a:r>
+            <a:endParaRPr lang="en-US" sz="4600" i="1" dirty="0">
+              <a:latin typeface="Times New Roman" panose="02020603050405020304" pitchFamily="18" charset="0"/>
+              <a:cs typeface="Times New Roman" panose="02020603050405020304" pitchFamily="18" charset="0"/>
+            </a:endParaRPr>
+          </a:p>
+        </p:txBody>
+      </p:sp>
+      <p:sp>
+        <p:nvSpPr>
+          <p:cNvPr id="23" name="TextBox 5">
+            <a:extLst>
+              <a:ext uri="{FF2B5EF4-FFF2-40B4-BE49-F238E27FC236}">
+                <a16:creationId xmlns:a16="http://schemas.microsoft.com/office/drawing/2014/main" id="{6BB8C9F5-9477-502A-A988-67F8C218F2CC}"/>
+              </a:ext>
+            </a:extLst>
+          </p:cNvPr>
+          <p:cNvSpPr txBox="1">
+            <a:spLocks noChangeArrowheads="1"/>
+          </p:cNvSpPr>
+          <p:nvPr/>
+        </p:nvSpPr>
+        <p:spPr bwMode="auto">
+          <a:xfrm>
+            <a:off x="31461149" y="27771074"/>
+            <a:ext cx="2512219" cy="584775"/>
+          </a:xfrm>
+          <a:prstGeom prst="rect">
+            <a:avLst/>
+          </a:prstGeom>
+          <a:noFill/>
+          <a:ln>
+            <a:noFill/>
+          </a:ln>
+          <a:extLst>
+            <a:ext uri="{909E8E84-426E-40DD-AFC4-6F175D3DCCD1}">
+              <a14:hiddenFill xmlns:a14="http://schemas.microsoft.com/office/drawing/2010/main">
+                <a:solidFill>
+                  <a:srgbClr val="FFFFFF"/>
+                </a:solidFill>
+              </a14:hiddenFill>
+            </a:ext>
+            <a:ext uri="{91240B29-F687-4F45-9708-019B960494DF}">
+              <a14:hiddenLine xmlns:a14="http://schemas.microsoft.com/office/drawing/2010/main" w="9525">
+                <a:solidFill>
+                  <a:srgbClr val="000000"/>
+                </a:solidFill>
+                <a:miter lim="800000"/>
+                <a:headEnd/>
+                <a:tailEnd/>
+              </a14:hiddenLine>
+            </a:ext>
+          </a:extLst>
+        </p:spPr>
+        <p:txBody>
+          <a:bodyPr wrap="square">
+            <a:spAutoFit/>
+          </a:bodyPr>
+          <a:lstStyle/>
+          <a:p>
+            <a:pPr algn="just"/>
+            <a:r>
+              <a:rPr lang="en-US" altLang="en-US" sz="3200" i="1" dirty="0">
+                <a:latin typeface="Times New Roman" panose="02020603050405020304" pitchFamily="18" charset="0"/>
+                <a:cs typeface="Times New Roman" panose="02020603050405020304" pitchFamily="18" charset="0"/>
+              </a:rPr>
+              <a:t>Poster </a:t>
+            </a:r>
+          </a:p>
+        </p:txBody>
+      </p:sp>
+      <p:sp>
+        <p:nvSpPr>
+          <p:cNvPr id="24" name="TextBox 5">
+            <a:extLst>
+              <a:ext uri="{FF2B5EF4-FFF2-40B4-BE49-F238E27FC236}">
+                <a16:creationId xmlns:a16="http://schemas.microsoft.com/office/drawing/2014/main" id="{79D7C189-8555-06CA-7112-254D77E1255B}"/>
+              </a:ext>
+            </a:extLst>
+          </p:cNvPr>
+          <p:cNvSpPr txBox="1">
+            <a:spLocks noChangeArrowheads="1"/>
+          </p:cNvSpPr>
+          <p:nvPr/>
+        </p:nvSpPr>
+        <p:spPr bwMode="auto">
+          <a:xfrm>
+            <a:off x="36722940" y="27817240"/>
+            <a:ext cx="2512219" cy="1077218"/>
+          </a:xfrm>
+          <a:prstGeom prst="rect">
+            <a:avLst/>
+          </a:prstGeom>
+          <a:noFill/>
+          <a:ln>
+            <a:noFill/>
+          </a:ln>
+          <a:extLst>
+            <a:ext uri="{909E8E84-426E-40DD-AFC4-6F175D3DCCD1}">
+              <a14:hiddenFill xmlns:a14="http://schemas.microsoft.com/office/drawing/2010/main">
+                <a:solidFill>
+                  <a:srgbClr val="FFFFFF"/>
+                </a:solidFill>
+              </a14:hiddenFill>
+            </a:ext>
+            <a:ext uri="{91240B29-F687-4F45-9708-019B960494DF}">
+              <a14:hiddenLine xmlns:a14="http://schemas.microsoft.com/office/drawing/2010/main" w="9525">
+                <a:solidFill>
+                  <a:srgbClr val="000000"/>
+                </a:solidFill>
+                <a:miter lim="800000"/>
+                <a:headEnd/>
+                <a:tailEnd/>
+              </a14:hiddenLine>
+            </a:ext>
+          </a:extLst>
+        </p:spPr>
+        <p:txBody>
+          <a:bodyPr wrap="square">
+            <a:spAutoFit/>
+          </a:bodyPr>
+          <a:lstStyle/>
+          <a:p>
+            <a:pPr algn="just"/>
+            <a:r>
+              <a:rPr lang="en-US" altLang="en-US" sz="3200" i="1" dirty="0">
+                <a:latin typeface="Times New Roman" panose="02020603050405020304" pitchFamily="18" charset="0"/>
+                <a:cs typeface="Times New Roman" panose="02020603050405020304" pitchFamily="18" charset="0"/>
+              </a:rPr>
+              <a:t>GitHub </a:t>
+            </a:r>
+          </a:p>
+          <a:p>
+            <a:pPr algn="just"/>
+            <a:r>
+              <a:rPr lang="en-US" altLang="en-US" sz="3200" i="1" dirty="0">
+                <a:latin typeface="Times New Roman" panose="02020603050405020304" pitchFamily="18" charset="0"/>
+                <a:cs typeface="Times New Roman" panose="02020603050405020304" pitchFamily="18" charset="0"/>
+              </a:rPr>
+              <a:t>Repository </a:t>
+            </a:r>
           </a:p>
         </p:txBody>
       </p:sp>

</xml_diff>